<commit_message>
15-10-19 feature extraction and classifier
</commit_message>
<xml_diff>
--- a/Research_Project_Presentation.pptx
+++ b/Research_Project_Presentation.pptx
@@ -5273,7 +5273,15 @@
             </a:r>
             <a:r>
               <a:rPr lang="en-AU" sz="2500" dirty="0"/>
-              <a:t> as input and outputs a vector indicating the probability of each note being active in that frame </a:t>
+              <a:t> (</a:t>
+            </a:r>
+            <a:r>
+              <a:rPr lang="en-AU" sz="2500"/>
+              <a:t>constant-q transform) </a:t>
+            </a:r>
+            <a:r>
+              <a:rPr lang="en-AU" sz="2500" dirty="0"/>
+              <a:t>as input and outputs a vector indicating the probability of each note being active in that frame </a:t>
             </a:r>
           </a:p>
         </p:txBody>

</xml_diff>